<commit_message>
bao cao bai tap lon
</commit_message>
<xml_diff>
--- a/3.PROJECT/BaoCaoBTL.pptx
+++ b/3.PROJECT/BaoCaoBTL.pptx
@@ -15,12 +15,16 @@
     <p:sldId id="263" r:id="rId9"/>
     <p:sldId id="264" r:id="rId10"/>
     <p:sldId id="265" r:id="rId11"/>
-    <p:sldId id="266" r:id="rId12"/>
-    <p:sldId id="267" r:id="rId13"/>
-    <p:sldId id="268" r:id="rId14"/>
-    <p:sldId id="269" r:id="rId15"/>
-    <p:sldId id="270" r:id="rId16"/>
-    <p:sldId id="271" r:id="rId17"/>
+    <p:sldId id="272" r:id="rId12"/>
+    <p:sldId id="273" r:id="rId13"/>
+    <p:sldId id="274" r:id="rId14"/>
+    <p:sldId id="275" r:id="rId15"/>
+    <p:sldId id="266" r:id="rId16"/>
+    <p:sldId id="267" r:id="rId17"/>
+    <p:sldId id="268" r:id="rId18"/>
+    <p:sldId id="269" r:id="rId19"/>
+    <p:sldId id="270" r:id="rId20"/>
+    <p:sldId id="271" r:id="rId21"/>
   </p:sldIdLst>
   <p:sldSz cx="9144000" cy="6858000" type="screen4x3"/>
   <p:notesSz cx="6858000" cy="9144000"/>
@@ -119,6 +123,22 @@
       </a:defRPr>
     </a:lvl9pPr>
   </p:defaultTextStyle>
+  <p:extLst>
+    <p:ext uri="{EFAFB233-063F-42B5-8137-9DF3F51BA10A}">
+      <p15:sldGuideLst xmlns:p15="http://schemas.microsoft.com/office/powerpoint/2012/main">
+        <p15:guide id="1" orient="horz" pos="2160">
+          <p15:clr>
+            <a:srgbClr val="A4A3A4"/>
+          </p15:clr>
+        </p15:guide>
+        <p15:guide id="2" pos="2880">
+          <p15:clr>
+            <a:srgbClr val="A4A3A4"/>
+          </p15:clr>
+        </p15:guide>
+      </p15:sldGuideLst>
+    </p:ext>
+  </p:extLst>
 </p:presentation>
 </file>
 
@@ -194,7 +214,7 @@
             <a:fld id="{1D8BD707-D9CF-40AE-B4C6-C98DA3205C09}" type="datetimeFigureOut">
               <a:rPr lang="en-US" smtClean="0"/>
               <a:pPr/>
-              <a:t>03-Nov-20</a:t>
+              <a:t>11/14/2020</a:t>
             </a:fld>
             <a:endParaRPr lang="en-US"/>
           </a:p>
@@ -721,7 +741,7 @@
             <a:fld id="{1D8BD707-D9CF-40AE-B4C6-C98DA3205C09}" type="datetimeFigureOut">
               <a:rPr lang="en-US" smtClean="0"/>
               <a:pPr/>
-              <a:t>03-Nov-20</a:t>
+              <a:t>11/14/2020</a:t>
             </a:fld>
             <a:endParaRPr lang="en-US"/>
           </a:p>
@@ -1037,7 +1057,7 @@
             <a:fld id="{1D8BD707-D9CF-40AE-B4C6-C98DA3205C09}" type="datetimeFigureOut">
               <a:rPr lang="en-US" smtClean="0"/>
               <a:pPr/>
-              <a:t>03-Nov-20</a:t>
+              <a:t>11/14/2020</a:t>
             </a:fld>
             <a:endParaRPr lang="en-US"/>
           </a:p>
@@ -1325,7 +1345,7 @@
             <a:fld id="{1D8BD707-D9CF-40AE-B4C6-C98DA3205C09}" type="datetimeFigureOut">
               <a:rPr lang="en-US" smtClean="0"/>
               <a:pPr/>
-              <a:t>03-Nov-20</a:t>
+              <a:t>11/14/2020</a:t>
             </a:fld>
             <a:endParaRPr lang="en-US"/>
           </a:p>
@@ -1902,7 +1922,7 @@
             <a:fld id="{1D8BD707-D9CF-40AE-B4C6-C98DA3205C09}" type="datetimeFigureOut">
               <a:rPr lang="en-US" smtClean="0"/>
               <a:pPr/>
-              <a:t>03-Nov-20</a:t>
+              <a:t>11/14/2020</a:t>
             </a:fld>
             <a:endParaRPr lang="en-US"/>
           </a:p>
@@ -1994,7 +2014,7 @@
             <a:fld id="{1D8BD707-D9CF-40AE-B4C6-C98DA3205C09}" type="datetimeFigureOut">
               <a:rPr lang="en-US" smtClean="0"/>
               <a:pPr/>
-              <a:t>03-Nov-20</a:t>
+              <a:t>11/14/2020</a:t>
             </a:fld>
             <a:endParaRPr lang="en-US"/>
           </a:p>
@@ -2705,7 +2725,7 @@
             <a:fld id="{1D8BD707-D9CF-40AE-B4C6-C98DA3205C09}" type="datetimeFigureOut">
               <a:rPr lang="en-US" smtClean="0"/>
               <a:pPr/>
-              <a:t>03-Nov-20</a:t>
+              <a:t>11/14/2020</a:t>
             </a:fld>
             <a:endParaRPr lang="en-US"/>
           </a:p>
@@ -2959,7 +2979,7 @@
             <a:fld id="{1D8BD707-D9CF-40AE-B4C6-C98DA3205C09}" type="datetimeFigureOut">
               <a:rPr lang="en-US" smtClean="0"/>
               <a:pPr/>
-              <a:t>03-Nov-20</a:t>
+              <a:t>11/14/2020</a:t>
             </a:fld>
             <a:endParaRPr lang="en-US"/>
           </a:p>
@@ -3190,7 +3210,7 @@
             <a:fld id="{1D8BD707-D9CF-40AE-B4C6-C98DA3205C09}" type="datetimeFigureOut">
               <a:rPr lang="en-US" smtClean="0"/>
               <a:pPr/>
-              <a:t>03-Nov-20</a:t>
+              <a:t>11/14/2020</a:t>
             </a:fld>
             <a:endParaRPr lang="en-US"/>
           </a:p>
@@ -3466,7 +3486,7 @@
             <a:fld id="{1D8BD707-D9CF-40AE-B4C6-C98DA3205C09}" type="datetimeFigureOut">
               <a:rPr lang="en-US" smtClean="0"/>
               <a:pPr/>
-              <a:t>03-Nov-20</a:t>
+              <a:t>11/14/2020</a:t>
             </a:fld>
             <a:endParaRPr lang="en-US"/>
           </a:p>
@@ -3754,7 +3774,7 @@
             <a:fld id="{1D8BD707-D9CF-40AE-B4C6-C98DA3205C09}" type="datetimeFigureOut">
               <a:rPr lang="en-US" smtClean="0"/>
               <a:pPr/>
-              <a:t>03-Nov-20</a:t>
+              <a:t>11/14/2020</a:t>
             </a:fld>
             <a:endParaRPr lang="en-US"/>
           </a:p>
@@ -4024,7 +4044,7 @@
             <a:fld id="{1D8BD707-D9CF-40AE-B4C6-C98DA3205C09}" type="datetimeFigureOut">
               <a:rPr lang="en-US" smtClean="0"/>
               <a:pPr/>
-              <a:t>03-Nov-20</a:t>
+              <a:t>11/14/2020</a:t>
             </a:fld>
             <a:endParaRPr lang="en-US"/>
           </a:p>
@@ -6333,372 +6353,34 @@
             <p:ph idx="1"/>
           </p:nvPr>
         </p:nvSpPr>
-        <p:spPr>
-          <a:xfrm>
-            <a:off x="699247" y="1295401"/>
-            <a:ext cx="7745505" cy="4830762"/>
-          </a:xfrm>
-        </p:spPr>
+        <p:spPr/>
         <p:txBody>
           <a:bodyPr/>
           <a:lstStyle/>
           <a:p>
-            <a:pPr marL="457200" indent="-457200">
-              <a:buAutoNum type="arabicPeriod"/>
-            </a:pPr>
-            <a:r>
-              <a:rPr lang="en-US" dirty="0" err="1" smtClean="0">
-                <a:latin typeface="Times New Roman" panose="02020603050405020304" pitchFamily="18" charset="0"/>
-                <a:cs typeface="Times New Roman" panose="02020603050405020304" pitchFamily="18" charset="0"/>
-              </a:rPr>
-              <a:t>Phân</a:t>
-            </a:r>
-            <a:r>
-              <a:rPr lang="en-US" dirty="0" smtClean="0">
-                <a:latin typeface="Times New Roman" panose="02020603050405020304" pitchFamily="18" charset="0"/>
-                <a:cs typeface="Times New Roman" panose="02020603050405020304" pitchFamily="18" charset="0"/>
-              </a:rPr>
-              <a:t> </a:t>
-            </a:r>
-            <a:r>
-              <a:rPr lang="en-US" dirty="0" err="1" smtClean="0">
-                <a:latin typeface="Times New Roman" panose="02020603050405020304" pitchFamily="18" charset="0"/>
-                <a:cs typeface="Times New Roman" panose="02020603050405020304" pitchFamily="18" charset="0"/>
-              </a:rPr>
-              <a:t>tích</a:t>
-            </a:r>
-            <a:r>
-              <a:rPr lang="en-US" dirty="0" smtClean="0">
-                <a:latin typeface="Times New Roman" panose="02020603050405020304" pitchFamily="18" charset="0"/>
-                <a:cs typeface="Times New Roman" panose="02020603050405020304" pitchFamily="18" charset="0"/>
-              </a:rPr>
-              <a:t> </a:t>
-            </a:r>
-            <a:r>
-              <a:rPr lang="en-US" dirty="0" err="1" smtClean="0">
-                <a:latin typeface="Times New Roman" panose="02020603050405020304" pitchFamily="18" charset="0"/>
-                <a:cs typeface="Times New Roman" panose="02020603050405020304" pitchFamily="18" charset="0"/>
-              </a:rPr>
-              <a:t>các</a:t>
-            </a:r>
-            <a:r>
-              <a:rPr lang="en-US" dirty="0" smtClean="0">
-                <a:latin typeface="Times New Roman" panose="02020603050405020304" pitchFamily="18" charset="0"/>
-                <a:cs typeface="Times New Roman" panose="02020603050405020304" pitchFamily="18" charset="0"/>
-              </a:rPr>
-              <a:t> </a:t>
-            </a:r>
-            <a:r>
-              <a:rPr lang="en-US" dirty="0" err="1" smtClean="0">
-                <a:latin typeface="Times New Roman" panose="02020603050405020304" pitchFamily="18" charset="0"/>
-                <a:cs typeface="Times New Roman" panose="02020603050405020304" pitchFamily="18" charset="0"/>
-              </a:rPr>
-              <a:t>yêu</a:t>
-            </a:r>
-            <a:r>
-              <a:rPr lang="en-US" dirty="0" smtClean="0">
-                <a:latin typeface="Times New Roman" panose="02020603050405020304" pitchFamily="18" charset="0"/>
-                <a:cs typeface="Times New Roman" panose="02020603050405020304" pitchFamily="18" charset="0"/>
-              </a:rPr>
-              <a:t> </a:t>
-            </a:r>
-            <a:r>
-              <a:rPr lang="en-US" dirty="0" err="1" smtClean="0">
-                <a:latin typeface="Times New Roman" panose="02020603050405020304" pitchFamily="18" charset="0"/>
-                <a:cs typeface="Times New Roman" panose="02020603050405020304" pitchFamily="18" charset="0"/>
-              </a:rPr>
-              <a:t>cầu</a:t>
-            </a:r>
-            <a:r>
-              <a:rPr lang="en-US" dirty="0" smtClean="0">
-                <a:latin typeface="Times New Roman" panose="02020603050405020304" pitchFamily="18" charset="0"/>
-                <a:cs typeface="Times New Roman" panose="02020603050405020304" pitchFamily="18" charset="0"/>
-              </a:rPr>
-              <a:t> </a:t>
-            </a:r>
-            <a:r>
-              <a:rPr lang="en-US" dirty="0" err="1" smtClean="0">
-                <a:latin typeface="Times New Roman" panose="02020603050405020304" pitchFamily="18" charset="0"/>
-                <a:cs typeface="Times New Roman" panose="02020603050405020304" pitchFamily="18" charset="0"/>
-              </a:rPr>
-              <a:t>chức</a:t>
-            </a:r>
-            <a:r>
-              <a:rPr lang="en-US" dirty="0" smtClean="0">
-                <a:latin typeface="Times New Roman" panose="02020603050405020304" pitchFamily="18" charset="0"/>
-                <a:cs typeface="Times New Roman" panose="02020603050405020304" pitchFamily="18" charset="0"/>
-              </a:rPr>
-              <a:t> </a:t>
-            </a:r>
-            <a:r>
-              <a:rPr lang="en-US" dirty="0" err="1" smtClean="0">
-                <a:latin typeface="Times New Roman" panose="02020603050405020304" pitchFamily="18" charset="0"/>
-                <a:cs typeface="Times New Roman" panose="02020603050405020304" pitchFamily="18" charset="0"/>
-              </a:rPr>
-              <a:t>năng</a:t>
-            </a:r>
-            <a:r>
-              <a:rPr lang="en-US" dirty="0">
-                <a:latin typeface="Times New Roman" panose="02020603050405020304" pitchFamily="18" charset="0"/>
-                <a:cs typeface="Times New Roman" panose="02020603050405020304" pitchFamily="18" charset="0"/>
-              </a:rPr>
-              <a:t> </a:t>
-            </a:r>
-            <a:r>
-              <a:rPr lang="en-US" dirty="0" smtClean="0">
-                <a:latin typeface="Times New Roman" panose="02020603050405020304" pitchFamily="18" charset="0"/>
-                <a:cs typeface="Times New Roman" panose="02020603050405020304" pitchFamily="18" charset="0"/>
-              </a:rPr>
-              <a:t>(UCD).</a:t>
-            </a:r>
-          </a:p>
-          <a:p>
-            <a:pPr marL="457200" indent="-457200">
-              <a:buAutoNum type="arabicPeriod"/>
-            </a:pPr>
-            <a:r>
-              <a:rPr lang="en-US" dirty="0" err="1" smtClean="0">
-                <a:latin typeface="Times New Roman" panose="02020603050405020304" pitchFamily="18" charset="0"/>
-                <a:cs typeface="Times New Roman" panose="02020603050405020304" pitchFamily="18" charset="0"/>
-              </a:rPr>
-              <a:t>Phân</a:t>
-            </a:r>
-            <a:r>
-              <a:rPr lang="en-US" dirty="0" smtClean="0">
-                <a:latin typeface="Times New Roman" panose="02020603050405020304" pitchFamily="18" charset="0"/>
-                <a:cs typeface="Times New Roman" panose="02020603050405020304" pitchFamily="18" charset="0"/>
-              </a:rPr>
-              <a:t> </a:t>
-            </a:r>
-            <a:r>
-              <a:rPr lang="en-US" dirty="0" err="1" smtClean="0">
-                <a:latin typeface="Times New Roman" panose="02020603050405020304" pitchFamily="18" charset="0"/>
-                <a:cs typeface="Times New Roman" panose="02020603050405020304" pitchFamily="18" charset="0"/>
-              </a:rPr>
-              <a:t>tích</a:t>
-            </a:r>
-            <a:r>
-              <a:rPr lang="en-US" dirty="0" smtClean="0">
-                <a:latin typeface="Times New Roman" panose="02020603050405020304" pitchFamily="18" charset="0"/>
-                <a:cs typeface="Times New Roman" panose="02020603050405020304" pitchFamily="18" charset="0"/>
-              </a:rPr>
-              <a:t> </a:t>
-            </a:r>
-            <a:r>
-              <a:rPr lang="en-US" dirty="0" err="1" smtClean="0">
-                <a:latin typeface="Times New Roman" panose="02020603050405020304" pitchFamily="18" charset="0"/>
-                <a:cs typeface="Times New Roman" panose="02020603050405020304" pitchFamily="18" charset="0"/>
-              </a:rPr>
-              <a:t>thiết</a:t>
-            </a:r>
-            <a:r>
-              <a:rPr lang="en-US" dirty="0" smtClean="0">
-                <a:latin typeface="Times New Roman" panose="02020603050405020304" pitchFamily="18" charset="0"/>
-                <a:cs typeface="Times New Roman" panose="02020603050405020304" pitchFamily="18" charset="0"/>
-              </a:rPr>
-              <a:t> </a:t>
-            </a:r>
-            <a:r>
-              <a:rPr lang="en-US" dirty="0" err="1" smtClean="0">
-                <a:latin typeface="Times New Roman" panose="02020603050405020304" pitchFamily="18" charset="0"/>
-                <a:cs typeface="Times New Roman" panose="02020603050405020304" pitchFamily="18" charset="0"/>
-              </a:rPr>
-              <a:t>kế</a:t>
-            </a:r>
-            <a:r>
-              <a:rPr lang="en-US" dirty="0" smtClean="0">
-                <a:latin typeface="Times New Roman" panose="02020603050405020304" pitchFamily="18" charset="0"/>
-                <a:cs typeface="Times New Roman" panose="02020603050405020304" pitchFamily="18" charset="0"/>
-              </a:rPr>
-              <a:t> CSDL.</a:t>
-            </a:r>
-          </a:p>
-          <a:p>
-            <a:pPr marL="457200" indent="-457200">
-              <a:buAutoNum type="arabicPeriod"/>
-            </a:pPr>
-            <a:r>
-              <a:rPr lang="en-US" dirty="0" err="1" smtClean="0">
-                <a:latin typeface="Times New Roman" panose="02020603050405020304" pitchFamily="18" charset="0"/>
-                <a:cs typeface="Times New Roman" panose="02020603050405020304" pitchFamily="18" charset="0"/>
-              </a:rPr>
-              <a:t>Chọn</a:t>
-            </a:r>
-            <a:r>
-              <a:rPr lang="en-US" dirty="0" smtClean="0">
-                <a:latin typeface="Times New Roman" panose="02020603050405020304" pitchFamily="18" charset="0"/>
-                <a:cs typeface="Times New Roman" panose="02020603050405020304" pitchFamily="18" charset="0"/>
-              </a:rPr>
-              <a:t> </a:t>
-            </a:r>
-            <a:r>
-              <a:rPr lang="en-US" dirty="0" err="1" smtClean="0">
-                <a:latin typeface="Times New Roman" panose="02020603050405020304" pitchFamily="18" charset="0"/>
-                <a:cs typeface="Times New Roman" panose="02020603050405020304" pitchFamily="18" charset="0"/>
-              </a:rPr>
-              <a:t>mô</a:t>
-            </a:r>
-            <a:r>
-              <a:rPr lang="en-US" dirty="0" smtClean="0">
-                <a:latin typeface="Times New Roman" panose="02020603050405020304" pitchFamily="18" charset="0"/>
-                <a:cs typeface="Times New Roman" panose="02020603050405020304" pitchFamily="18" charset="0"/>
-              </a:rPr>
-              <a:t> </a:t>
-            </a:r>
-            <a:r>
-              <a:rPr lang="en-US" dirty="0" err="1" smtClean="0">
-                <a:latin typeface="Times New Roman" panose="02020603050405020304" pitchFamily="18" charset="0"/>
-                <a:cs typeface="Times New Roman" panose="02020603050405020304" pitchFamily="18" charset="0"/>
-              </a:rPr>
-              <a:t>hình</a:t>
-            </a:r>
-            <a:r>
-              <a:rPr lang="en-US" dirty="0" smtClean="0">
-                <a:latin typeface="Times New Roman" panose="02020603050405020304" pitchFamily="18" charset="0"/>
-                <a:cs typeface="Times New Roman" panose="02020603050405020304" pitchFamily="18" charset="0"/>
-              </a:rPr>
-              <a:t> </a:t>
-            </a:r>
-            <a:r>
-              <a:rPr lang="en-US" dirty="0" err="1" smtClean="0">
-                <a:latin typeface="Times New Roman" panose="02020603050405020304" pitchFamily="18" charset="0"/>
-                <a:cs typeface="Times New Roman" panose="02020603050405020304" pitchFamily="18" charset="0"/>
-              </a:rPr>
-              <a:t>phát</a:t>
-            </a:r>
-            <a:r>
-              <a:rPr lang="en-US" dirty="0" smtClean="0">
-                <a:latin typeface="Times New Roman" panose="02020603050405020304" pitchFamily="18" charset="0"/>
-                <a:cs typeface="Times New Roman" panose="02020603050405020304" pitchFamily="18" charset="0"/>
-              </a:rPr>
-              <a:t> </a:t>
-            </a:r>
-            <a:r>
-              <a:rPr lang="en-US" dirty="0" err="1" smtClean="0">
-                <a:latin typeface="Times New Roman" panose="02020603050405020304" pitchFamily="18" charset="0"/>
-                <a:cs typeface="Times New Roman" panose="02020603050405020304" pitchFamily="18" charset="0"/>
-              </a:rPr>
-              <a:t>triển</a:t>
-            </a:r>
-            <a:r>
-              <a:rPr lang="en-US" dirty="0" smtClean="0">
-                <a:latin typeface="Times New Roman" panose="02020603050405020304" pitchFamily="18" charset="0"/>
-                <a:cs typeface="Times New Roman" panose="02020603050405020304" pitchFamily="18" charset="0"/>
-              </a:rPr>
-              <a:t>.</a:t>
-            </a:r>
-          </a:p>
-          <a:p>
-            <a:pPr marL="457200" indent="-457200">
-              <a:buAutoNum type="arabicPeriod"/>
-            </a:pPr>
-            <a:r>
-              <a:rPr lang="en-US" dirty="0" err="1" smtClean="0">
-                <a:latin typeface="Times New Roman" panose="02020603050405020304" pitchFamily="18" charset="0"/>
-                <a:cs typeface="Times New Roman" panose="02020603050405020304" pitchFamily="18" charset="0"/>
-              </a:rPr>
-              <a:t>Thiết</a:t>
-            </a:r>
-            <a:r>
-              <a:rPr lang="en-US" dirty="0" smtClean="0">
-                <a:latin typeface="Times New Roman" panose="02020603050405020304" pitchFamily="18" charset="0"/>
-                <a:cs typeface="Times New Roman" panose="02020603050405020304" pitchFamily="18" charset="0"/>
-              </a:rPr>
-              <a:t> </a:t>
-            </a:r>
-            <a:r>
-              <a:rPr lang="en-US" dirty="0" err="1" smtClean="0">
-                <a:latin typeface="Times New Roman" panose="02020603050405020304" pitchFamily="18" charset="0"/>
-                <a:cs typeface="Times New Roman" panose="02020603050405020304" pitchFamily="18" charset="0"/>
-              </a:rPr>
-              <a:t>kế</a:t>
-            </a:r>
-            <a:r>
-              <a:rPr lang="en-US" dirty="0" smtClean="0">
-                <a:latin typeface="Times New Roman" panose="02020603050405020304" pitchFamily="18" charset="0"/>
-                <a:cs typeface="Times New Roman" panose="02020603050405020304" pitchFamily="18" charset="0"/>
-              </a:rPr>
-              <a:t> code.</a:t>
-            </a:r>
-          </a:p>
-          <a:p>
-            <a:pPr marL="457200" indent="-457200">
-              <a:buAutoNum type="arabicPeriod"/>
-            </a:pPr>
-            <a:r>
-              <a:rPr lang="en-US" dirty="0" err="1" smtClean="0">
-                <a:latin typeface="Times New Roman" panose="02020603050405020304" pitchFamily="18" charset="0"/>
-                <a:cs typeface="Times New Roman" panose="02020603050405020304" pitchFamily="18" charset="0"/>
-              </a:rPr>
-              <a:t>Phác</a:t>
-            </a:r>
-            <a:r>
-              <a:rPr lang="en-US" dirty="0" smtClean="0">
-                <a:latin typeface="Times New Roman" panose="02020603050405020304" pitchFamily="18" charset="0"/>
-                <a:cs typeface="Times New Roman" panose="02020603050405020304" pitchFamily="18" charset="0"/>
-              </a:rPr>
-              <a:t> </a:t>
-            </a:r>
-            <a:r>
-              <a:rPr lang="en-US" dirty="0" err="1" smtClean="0">
-                <a:latin typeface="Times New Roman" panose="02020603050405020304" pitchFamily="18" charset="0"/>
-                <a:cs typeface="Times New Roman" panose="02020603050405020304" pitchFamily="18" charset="0"/>
-              </a:rPr>
-              <a:t>thảo</a:t>
-            </a:r>
-            <a:r>
-              <a:rPr lang="en-US" dirty="0" smtClean="0">
-                <a:latin typeface="Times New Roman" panose="02020603050405020304" pitchFamily="18" charset="0"/>
-                <a:cs typeface="Times New Roman" panose="02020603050405020304" pitchFamily="18" charset="0"/>
-              </a:rPr>
-              <a:t> </a:t>
-            </a:r>
-            <a:r>
-              <a:rPr lang="en-US" dirty="0" err="1" smtClean="0">
-                <a:latin typeface="Times New Roman" panose="02020603050405020304" pitchFamily="18" charset="0"/>
-                <a:cs typeface="Times New Roman" panose="02020603050405020304" pitchFamily="18" charset="0"/>
-              </a:rPr>
-              <a:t>giao</a:t>
-            </a:r>
-            <a:r>
-              <a:rPr lang="en-US" dirty="0" smtClean="0">
-                <a:latin typeface="Times New Roman" panose="02020603050405020304" pitchFamily="18" charset="0"/>
-                <a:cs typeface="Times New Roman" panose="02020603050405020304" pitchFamily="18" charset="0"/>
-              </a:rPr>
-              <a:t> </a:t>
-            </a:r>
-            <a:r>
-              <a:rPr lang="en-US" dirty="0" err="1" smtClean="0">
-                <a:latin typeface="Times New Roman" panose="02020603050405020304" pitchFamily="18" charset="0"/>
-                <a:cs typeface="Times New Roman" panose="02020603050405020304" pitchFamily="18" charset="0"/>
-              </a:rPr>
-              <a:t>diện</a:t>
-            </a:r>
-            <a:r>
-              <a:rPr lang="en-US" dirty="0" smtClean="0">
-                <a:latin typeface="Times New Roman" panose="02020603050405020304" pitchFamily="18" charset="0"/>
-                <a:cs typeface="Times New Roman" panose="02020603050405020304" pitchFamily="18" charset="0"/>
-              </a:rPr>
-              <a:t> ban </a:t>
-            </a:r>
-            <a:r>
-              <a:rPr lang="en-US" dirty="0" err="1" smtClean="0">
-                <a:latin typeface="Times New Roman" panose="02020603050405020304" pitchFamily="18" charset="0"/>
-                <a:cs typeface="Times New Roman" panose="02020603050405020304" pitchFamily="18" charset="0"/>
-              </a:rPr>
-              <a:t>đầu</a:t>
-            </a:r>
-            <a:r>
-              <a:rPr lang="en-US" dirty="0" smtClean="0">
-                <a:latin typeface="Times New Roman" panose="02020603050405020304" pitchFamily="18" charset="0"/>
-                <a:cs typeface="Times New Roman" panose="02020603050405020304" pitchFamily="18" charset="0"/>
-              </a:rPr>
-              <a:t>.</a:t>
-            </a:r>
-            <a:endParaRPr lang="en-US" dirty="0">
-              <a:latin typeface="Times New Roman" panose="02020603050405020304" pitchFamily="18" charset="0"/>
-              <a:cs typeface="Times New Roman" panose="02020603050405020304" pitchFamily="18" charset="0"/>
-            </a:endParaRPr>
+            <a:r>
+              <a:rPr lang="en-US" dirty="0" smtClean="0"/>
+              <a:t>1. phân tích và thiết kế các yêu cầu chức năng </a:t>
+            </a:r>
+          </a:p>
+          <a:p>
+            <a:r>
+              <a:rPr lang="en-US" dirty="0" smtClean="0"/>
+              <a:t>2. phân thích và thiết kế cơ sở dữ liệu</a:t>
+            </a:r>
+          </a:p>
+          <a:p>
+            <a:r>
+              <a:rPr lang="en-US" dirty="0" smtClean="0"/>
+              <a:t>3. thiết kế giao diện dự tính tiến hành</a:t>
+            </a:r>
+          </a:p>
+          <a:p>
+            <a:r>
+              <a:rPr lang="en-US" dirty="0" smtClean="0"/>
+              <a:t>4. Nav Code</a:t>
+            </a:r>
+            <a:endParaRPr lang="vi-VN" dirty="0"/>
           </a:p>
         </p:txBody>
       </p:sp>
@@ -6712,154 +6394,37 @@
             <p:ph type="title"/>
           </p:nvPr>
         </p:nvSpPr>
-        <p:spPr>
-          <a:xfrm>
-            <a:off x="609600" y="152400"/>
-            <a:ext cx="7756263" cy="1054250"/>
-          </a:xfrm>
-        </p:spPr>
+        <p:spPr/>
         <p:txBody>
           <a:bodyPr/>
           <a:lstStyle/>
           <a:p>
-            <a:pPr algn="l"/>
-            <a:r>
-              <a:rPr lang="en-US" sz="3200" dirty="0" smtClean="0">
-                <a:solidFill>
-                  <a:schemeClr val="tx2">
-                    <a:lumMod val="75000"/>
-                  </a:schemeClr>
-                </a:solidFill>
-                <a:latin typeface="Times New Roman" panose="02020603050405020304" pitchFamily="18" charset="0"/>
-                <a:cs typeface="Times New Roman" panose="02020603050405020304" pitchFamily="18" charset="0"/>
-              </a:rPr>
-              <a:t>II. </a:t>
-            </a:r>
-            <a:r>
-              <a:rPr lang="en-US" sz="3200" dirty="0" err="1" smtClean="0">
-                <a:solidFill>
-                  <a:schemeClr val="tx2">
-                    <a:lumMod val="75000"/>
-                  </a:schemeClr>
-                </a:solidFill>
-                <a:latin typeface="Times New Roman" panose="02020603050405020304" pitchFamily="18" charset="0"/>
-                <a:cs typeface="Times New Roman" panose="02020603050405020304" pitchFamily="18" charset="0"/>
-              </a:rPr>
-              <a:t>Thiết</a:t>
-            </a:r>
-            <a:r>
-              <a:rPr lang="en-US" sz="3200" dirty="0" smtClean="0">
-                <a:solidFill>
-                  <a:schemeClr val="tx2">
-                    <a:lumMod val="75000"/>
-                  </a:schemeClr>
-                </a:solidFill>
-                <a:latin typeface="Times New Roman" panose="02020603050405020304" pitchFamily="18" charset="0"/>
-                <a:cs typeface="Times New Roman" panose="02020603050405020304" pitchFamily="18" charset="0"/>
-              </a:rPr>
-              <a:t> </a:t>
-            </a:r>
-            <a:r>
-              <a:rPr lang="en-US" sz="3200" dirty="0" err="1" smtClean="0">
-                <a:solidFill>
-                  <a:schemeClr val="tx2">
-                    <a:lumMod val="75000"/>
-                  </a:schemeClr>
-                </a:solidFill>
-                <a:latin typeface="Times New Roman" panose="02020603050405020304" pitchFamily="18" charset="0"/>
-                <a:cs typeface="Times New Roman" panose="02020603050405020304" pitchFamily="18" charset="0"/>
-              </a:rPr>
-              <a:t>kế</a:t>
-            </a:r>
-            <a:r>
-              <a:rPr lang="en-US" sz="3200" dirty="0" smtClean="0">
-                <a:solidFill>
-                  <a:schemeClr val="tx2">
-                    <a:lumMod val="75000"/>
-                  </a:schemeClr>
-                </a:solidFill>
-                <a:latin typeface="Times New Roman" panose="02020603050405020304" pitchFamily="18" charset="0"/>
-                <a:cs typeface="Times New Roman" panose="02020603050405020304" pitchFamily="18" charset="0"/>
-              </a:rPr>
-              <a:t> </a:t>
-            </a:r>
-            <a:r>
-              <a:rPr lang="en-US" sz="3200" dirty="0" err="1" smtClean="0">
-                <a:solidFill>
-                  <a:schemeClr val="tx2">
-                    <a:lumMod val="75000"/>
-                  </a:schemeClr>
-                </a:solidFill>
-                <a:latin typeface="Times New Roman" panose="02020603050405020304" pitchFamily="18" charset="0"/>
-                <a:cs typeface="Times New Roman" panose="02020603050405020304" pitchFamily="18" charset="0"/>
-              </a:rPr>
-              <a:t>diễn</a:t>
-            </a:r>
-            <a:r>
-              <a:rPr lang="en-US" sz="3200" dirty="0" smtClean="0">
-                <a:solidFill>
-                  <a:schemeClr val="tx2">
-                    <a:lumMod val="75000"/>
-                  </a:schemeClr>
-                </a:solidFill>
-                <a:latin typeface="Times New Roman" panose="02020603050405020304" pitchFamily="18" charset="0"/>
-                <a:cs typeface="Times New Roman" panose="02020603050405020304" pitchFamily="18" charset="0"/>
-              </a:rPr>
-              <a:t> </a:t>
-            </a:r>
-            <a:r>
-              <a:rPr lang="en-US" sz="3200" dirty="0" err="1" smtClean="0">
-                <a:solidFill>
-                  <a:schemeClr val="tx2">
-                    <a:lumMod val="75000"/>
-                  </a:schemeClr>
-                </a:solidFill>
-                <a:latin typeface="Times New Roman" panose="02020603050405020304" pitchFamily="18" charset="0"/>
-                <a:cs typeface="Times New Roman" panose="02020603050405020304" pitchFamily="18" charset="0"/>
-              </a:rPr>
-              <a:t>đàn</a:t>
-            </a:r>
-            <a:r>
-              <a:rPr lang="en-US" sz="3200" dirty="0" smtClean="0">
-                <a:solidFill>
-                  <a:schemeClr val="tx2">
-                    <a:lumMod val="75000"/>
-                  </a:schemeClr>
-                </a:solidFill>
-                <a:latin typeface="Times New Roman" panose="02020603050405020304" pitchFamily="18" charset="0"/>
-                <a:cs typeface="Times New Roman" panose="02020603050405020304" pitchFamily="18" charset="0"/>
-              </a:rPr>
-              <a:t> CNTT</a:t>
-            </a:r>
-            <a:endParaRPr lang="en-US" sz="3200" dirty="0">
-              <a:solidFill>
-                <a:schemeClr val="tx2">
-                  <a:lumMod val="75000"/>
-                </a:schemeClr>
-              </a:solidFill>
-              <a:latin typeface="Times New Roman" panose="02020603050405020304" pitchFamily="18" charset="0"/>
-              <a:cs typeface="Times New Roman" panose="02020603050405020304" pitchFamily="18" charset="0"/>
-            </a:endParaRPr>
+            <a:r>
+              <a:rPr lang="en-US" sz="4000" dirty="0">
+                <a:solidFill>
+                  <a:schemeClr val="tx2">
+                    <a:lumMod val="75000"/>
+                  </a:schemeClr>
+                </a:solidFill>
+                <a:latin typeface="Times New Roman" panose="02020603050405020304" pitchFamily="18" charset="0"/>
+                <a:cs typeface="Times New Roman" panose="02020603050405020304" pitchFamily="18" charset="0"/>
+              </a:rPr>
+              <a:t>II. Thiết kế web khoa CNTT</a:t>
+            </a:r>
+            <a:endParaRPr lang="vi-VN" sz="4000" dirty="0"/>
           </a:p>
         </p:txBody>
       </p:sp>
     </p:spTree>
     <p:extLst>
       <p:ext uri="{BB962C8B-B14F-4D97-AF65-F5344CB8AC3E}">
-        <p14:creationId xmlns:p14="http://schemas.microsoft.com/office/powerpoint/2010/main" val="3848830760"/>
+        <p14:creationId xmlns:p14="http://schemas.microsoft.com/office/powerpoint/2010/main" val="3794430946"/>
       </p:ext>
     </p:extLst>
   </p:cSld>
   <p:clrMapOvr>
     <a:masterClrMapping/>
   </p:clrMapOvr>
-  <p:timing>
-    <p:tnLst>
-      <p:par>
-        <p:cTn id="1" dur="indefinite" restart="never" nodeType="tmRoot"/>
-      </p:par>
-    </p:tnLst>
-  </p:timing>
 </p:sld>
 </file>
 
@@ -6882,63 +6447,36 @@
       </p:grpSpPr>
       <p:sp>
         <p:nvSpPr>
-          <p:cNvPr id="2" name="Content Placeholder 1"/>
+          <p:cNvPr id="3" name="Title 2"/>
           <p:cNvSpPr>
             <a:spLocks noGrp="1"/>
           </p:cNvSpPr>
           <p:nvPr>
-            <p:ph idx="1"/>
+            <p:ph type="title"/>
           </p:nvPr>
         </p:nvSpPr>
-        <p:spPr>
-          <a:xfrm>
-            <a:off x="699247" y="381001"/>
-            <a:ext cx="7745505" cy="5745162"/>
-          </a:xfrm>
-        </p:spPr>
+        <p:spPr/>
         <p:txBody>
           <a:bodyPr/>
           <a:lstStyle/>
           <a:p>
-            <a:pPr marL="0" indent="0">
-              <a:buNone/>
-            </a:pPr>
             <a:r>
               <a:rPr lang="en-US" dirty="0" smtClean="0"/>
-              <a:t>1. </a:t>
-            </a:r>
-            <a:r>
-              <a:rPr lang="en-US" dirty="0" err="1" smtClean="0"/>
-              <a:t>Sơ</a:t>
-            </a:r>
-            <a:r>
-              <a:rPr lang="en-US" dirty="0" smtClean="0"/>
-              <a:t> </a:t>
-            </a:r>
-            <a:r>
-              <a:rPr lang="en-US" dirty="0" err="1" smtClean="0"/>
-              <a:t>đồ</a:t>
-            </a:r>
-            <a:r>
-              <a:rPr lang="en-US" dirty="0" smtClean="0"/>
-              <a:t> use case</a:t>
-            </a:r>
-          </a:p>
-          <a:p>
-            <a:pPr marL="0" indent="0">
-              <a:buNone/>
-            </a:pPr>
-            <a:endParaRPr lang="en-US" dirty="0"/>
+              <a:t>CSDL</a:t>
+            </a:r>
+            <a:endParaRPr lang="vi-VN" dirty="0"/>
           </a:p>
         </p:txBody>
       </p:sp>
       <p:pic>
         <p:nvPicPr>
-          <p:cNvPr id="1026" name="Picture 2" descr="C:\Users\hieus\OneDrive\Máy tính\UC_BTL.jpg"/>
+          <p:cNvPr id="4" name="Content Placeholder 3"/>
           <p:cNvPicPr>
-            <a:picLocks noChangeAspect="1" noChangeArrowheads="1"/>
+            <a:picLocks noGrp="1"/>
           </p:cNvPicPr>
-          <p:nvPr/>
+          <p:nvPr>
+            <p:ph idx="1"/>
+          </p:nvPr>
         </p:nvPicPr>
         <p:blipFill>
           <a:blip r:embed="rId2">
@@ -6955,28 +6493,22 @@
         </p:blipFill>
         <p:spPr bwMode="auto">
           <a:xfrm>
-            <a:off x="1295400" y="914399"/>
-            <a:ext cx="6891068" cy="5539055"/>
+            <a:off x="1633220" y="2133600"/>
+            <a:ext cx="6139179" cy="3992563"/>
           </a:xfrm>
           <a:prstGeom prst="rect">
             <a:avLst/>
           </a:prstGeom>
           <a:noFill/>
-          <a:extLst>
-            <a:ext uri="{909E8E84-426E-40DD-AFC4-6F175D3DCCD1}">
-              <a14:hiddenFill xmlns:a14="http://schemas.microsoft.com/office/drawing/2010/main">
-                <a:solidFill>
-                  <a:srgbClr val="FFFFFF"/>
-                </a:solidFill>
-              </a14:hiddenFill>
-            </a:ext>
-          </a:extLst>
+          <a:ln>
+            <a:noFill/>
+          </a:ln>
         </p:spPr>
       </p:pic>
     </p:spTree>
     <p:extLst>
       <p:ext uri="{BB962C8B-B14F-4D97-AF65-F5344CB8AC3E}">
-        <p14:creationId xmlns:p14="http://schemas.microsoft.com/office/powerpoint/2010/main" val="2181941062"/>
+        <p14:creationId xmlns:p14="http://schemas.microsoft.com/office/powerpoint/2010/main" val="2161886747"/>
       </p:ext>
     </p:extLst>
   </p:cSld>
@@ -7013,6 +6545,929 @@
             <p:ph idx="1"/>
           </p:nvPr>
         </p:nvSpPr>
+        <p:spPr/>
+        <p:txBody>
+          <a:bodyPr/>
+          <a:lstStyle/>
+          <a:p>
+            <a:endParaRPr lang="vi-VN"/>
+          </a:p>
+        </p:txBody>
+      </p:sp>
+      <p:sp>
+        <p:nvSpPr>
+          <p:cNvPr id="3" name="Title 2"/>
+          <p:cNvSpPr>
+            <a:spLocks noGrp="1"/>
+          </p:cNvSpPr>
+          <p:nvPr>
+            <p:ph type="title"/>
+          </p:nvPr>
+        </p:nvSpPr>
+        <p:spPr/>
+        <p:txBody>
+          <a:bodyPr/>
+          <a:lstStyle/>
+          <a:p>
+            <a:r>
+              <a:rPr lang="en-US" dirty="0" smtClean="0"/>
+              <a:t>Giao diện dự tính </a:t>
+            </a:r>
+            <a:endParaRPr lang="vi-VN" dirty="0"/>
+          </a:p>
+        </p:txBody>
+      </p:sp>
+      <p:pic>
+        <p:nvPicPr>
+          <p:cNvPr id="4" name="Picture 3"/>
+          <p:cNvPicPr>
+            <a:picLocks noChangeAspect="1"/>
+          </p:cNvPicPr>
+          <p:nvPr/>
+        </p:nvPicPr>
+        <p:blipFill>
+          <a:blip r:embed="rId2"/>
+          <a:stretch>
+            <a:fillRect/>
+          </a:stretch>
+        </p:blipFill>
+        <p:spPr>
+          <a:xfrm>
+            <a:off x="2971800" y="1588547"/>
+            <a:ext cx="2743200" cy="5146334"/>
+          </a:xfrm>
+          <a:prstGeom prst="rect">
+            <a:avLst/>
+          </a:prstGeom>
+        </p:spPr>
+      </p:pic>
+    </p:spTree>
+    <p:extLst>
+      <p:ext uri="{BB962C8B-B14F-4D97-AF65-F5344CB8AC3E}">
+        <p14:creationId xmlns:p14="http://schemas.microsoft.com/office/powerpoint/2010/main" val="2869680385"/>
+      </p:ext>
+    </p:extLst>
+  </p:cSld>
+  <p:clrMapOvr>
+    <a:masterClrMapping/>
+  </p:clrMapOvr>
+</p:sld>
+</file>
+
+<file path=ppt/slides/slide14.xml><?xml version="1.0" encoding="utf-8"?>
+<p:sld xmlns:a="http://schemas.openxmlformats.org/drawingml/2006/main" xmlns:r="http://schemas.openxmlformats.org/officeDocument/2006/relationships" xmlns:p="http://schemas.openxmlformats.org/presentationml/2006/main">
+  <p:cSld>
+    <p:spTree>
+      <p:nvGrpSpPr>
+        <p:cNvPr id="1" name=""/>
+        <p:cNvGrpSpPr/>
+        <p:nvPr/>
+      </p:nvGrpSpPr>
+      <p:grpSpPr>
+        <a:xfrm>
+          <a:off x="0" y="0"/>
+          <a:ext cx="0" cy="0"/>
+          <a:chOff x="0" y="0"/>
+          <a:chExt cx="0" cy="0"/>
+        </a:xfrm>
+      </p:grpSpPr>
+      <p:pic>
+        <p:nvPicPr>
+          <p:cNvPr id="7" name="Content Placeholder 6"/>
+          <p:cNvPicPr>
+            <a:picLocks noGrp="1" noChangeAspect="1"/>
+          </p:cNvPicPr>
+          <p:nvPr>
+            <p:ph idx="1"/>
+          </p:nvPr>
+        </p:nvPicPr>
+        <p:blipFill>
+          <a:blip r:embed="rId2"/>
+          <a:stretch>
+            <a:fillRect/>
+          </a:stretch>
+        </p:blipFill>
+        <p:spPr>
+          <a:xfrm>
+            <a:off x="3434174" y="1686044"/>
+            <a:ext cx="1828800" cy="5219034"/>
+          </a:xfrm>
+          <a:prstGeom prst="rect">
+            <a:avLst/>
+          </a:prstGeom>
+        </p:spPr>
+      </p:pic>
+      <p:sp>
+        <p:nvSpPr>
+          <p:cNvPr id="3" name="Title 2"/>
+          <p:cNvSpPr>
+            <a:spLocks noGrp="1"/>
+          </p:cNvSpPr>
+          <p:nvPr>
+            <p:ph type="title"/>
+          </p:nvPr>
+        </p:nvSpPr>
+        <p:spPr/>
+        <p:txBody>
+          <a:bodyPr/>
+          <a:lstStyle/>
+          <a:p>
+            <a:endParaRPr lang="vi-VN" dirty="0"/>
+          </a:p>
+        </p:txBody>
+      </p:sp>
+      <p:pic>
+        <p:nvPicPr>
+          <p:cNvPr id="4" name="Picture 3"/>
+          <p:cNvPicPr>
+            <a:picLocks noChangeAspect="1"/>
+          </p:cNvPicPr>
+          <p:nvPr/>
+        </p:nvPicPr>
+        <p:blipFill>
+          <a:blip r:embed="rId3"/>
+          <a:stretch>
+            <a:fillRect/>
+          </a:stretch>
+        </p:blipFill>
+        <p:spPr>
+          <a:xfrm>
+            <a:off x="457200" y="1686044"/>
+            <a:ext cx="2007566" cy="3124200"/>
+          </a:xfrm>
+          <a:prstGeom prst="rect">
+            <a:avLst/>
+          </a:prstGeom>
+        </p:spPr>
+      </p:pic>
+      <p:pic>
+        <p:nvPicPr>
+          <p:cNvPr id="5" name="Picture 4"/>
+          <p:cNvPicPr>
+            <a:picLocks noChangeAspect="1"/>
+          </p:cNvPicPr>
+          <p:nvPr/>
+        </p:nvPicPr>
+        <p:blipFill>
+          <a:blip r:embed="rId4"/>
+          <a:stretch>
+            <a:fillRect/>
+          </a:stretch>
+        </p:blipFill>
+        <p:spPr>
+          <a:xfrm>
+            <a:off x="6560372" y="3574688"/>
+            <a:ext cx="2184464" cy="3171329"/>
+          </a:xfrm>
+          <a:prstGeom prst="rect">
+            <a:avLst/>
+          </a:prstGeom>
+        </p:spPr>
+      </p:pic>
+      <p:pic>
+        <p:nvPicPr>
+          <p:cNvPr id="6" name="Picture 5"/>
+          <p:cNvPicPr>
+            <a:picLocks noChangeAspect="1"/>
+          </p:cNvPicPr>
+          <p:nvPr/>
+        </p:nvPicPr>
+        <p:blipFill>
+          <a:blip r:embed="rId5"/>
+          <a:stretch>
+            <a:fillRect/>
+          </a:stretch>
+        </p:blipFill>
+        <p:spPr>
+          <a:xfrm>
+            <a:off x="6560372" y="1686044"/>
+            <a:ext cx="2184464" cy="1827006"/>
+          </a:xfrm>
+          <a:prstGeom prst="rect">
+            <a:avLst/>
+          </a:prstGeom>
+        </p:spPr>
+      </p:pic>
+    </p:spTree>
+    <p:extLst>
+      <p:ext uri="{BB962C8B-B14F-4D97-AF65-F5344CB8AC3E}">
+        <p14:creationId xmlns:p14="http://schemas.microsoft.com/office/powerpoint/2010/main" val="889640440"/>
+      </p:ext>
+    </p:extLst>
+  </p:cSld>
+  <p:clrMapOvr>
+    <a:masterClrMapping/>
+  </p:clrMapOvr>
+</p:sld>
+</file>
+
+<file path=ppt/slides/slide15.xml><?xml version="1.0" encoding="utf-8"?>
+<p:sld xmlns:a="http://schemas.openxmlformats.org/drawingml/2006/main" xmlns:r="http://schemas.openxmlformats.org/officeDocument/2006/relationships" xmlns:p="http://schemas.openxmlformats.org/presentationml/2006/main">
+  <p:cSld>
+    <p:spTree>
+      <p:nvGrpSpPr>
+        <p:cNvPr id="1" name=""/>
+        <p:cNvGrpSpPr/>
+        <p:nvPr/>
+      </p:nvGrpSpPr>
+      <p:grpSpPr>
+        <a:xfrm>
+          <a:off x="0" y="0"/>
+          <a:ext cx="0" cy="0"/>
+          <a:chOff x="0" y="0"/>
+          <a:chExt cx="0" cy="0"/>
+        </a:xfrm>
+      </p:grpSpPr>
+      <p:sp>
+        <p:nvSpPr>
+          <p:cNvPr id="2" name="Content Placeholder 1"/>
+          <p:cNvSpPr>
+            <a:spLocks noGrp="1"/>
+          </p:cNvSpPr>
+          <p:nvPr>
+            <p:ph idx="1"/>
+          </p:nvPr>
+        </p:nvSpPr>
+        <p:spPr>
+          <a:xfrm>
+            <a:off x="699247" y="1295401"/>
+            <a:ext cx="7745505" cy="4830762"/>
+          </a:xfrm>
+        </p:spPr>
+        <p:txBody>
+          <a:bodyPr/>
+          <a:lstStyle/>
+          <a:p>
+            <a:pPr marL="457200" indent="-457200">
+              <a:buAutoNum type="arabicPeriod"/>
+            </a:pPr>
+            <a:r>
+              <a:rPr lang="en-US" dirty="0" err="1" smtClean="0">
+                <a:latin typeface="Times New Roman" panose="02020603050405020304" pitchFamily="18" charset="0"/>
+                <a:cs typeface="Times New Roman" panose="02020603050405020304" pitchFamily="18" charset="0"/>
+              </a:rPr>
+              <a:t>Phân</a:t>
+            </a:r>
+            <a:r>
+              <a:rPr lang="en-US" dirty="0" smtClean="0">
+                <a:latin typeface="Times New Roman" panose="02020603050405020304" pitchFamily="18" charset="0"/>
+                <a:cs typeface="Times New Roman" panose="02020603050405020304" pitchFamily="18" charset="0"/>
+              </a:rPr>
+              <a:t> </a:t>
+            </a:r>
+            <a:r>
+              <a:rPr lang="en-US" dirty="0" err="1" smtClean="0">
+                <a:latin typeface="Times New Roman" panose="02020603050405020304" pitchFamily="18" charset="0"/>
+                <a:cs typeface="Times New Roman" panose="02020603050405020304" pitchFamily="18" charset="0"/>
+              </a:rPr>
+              <a:t>tích</a:t>
+            </a:r>
+            <a:r>
+              <a:rPr lang="en-US" dirty="0" smtClean="0">
+                <a:latin typeface="Times New Roman" panose="02020603050405020304" pitchFamily="18" charset="0"/>
+                <a:cs typeface="Times New Roman" panose="02020603050405020304" pitchFamily="18" charset="0"/>
+              </a:rPr>
+              <a:t> </a:t>
+            </a:r>
+            <a:r>
+              <a:rPr lang="en-US" dirty="0" err="1" smtClean="0">
+                <a:latin typeface="Times New Roman" panose="02020603050405020304" pitchFamily="18" charset="0"/>
+                <a:cs typeface="Times New Roman" panose="02020603050405020304" pitchFamily="18" charset="0"/>
+              </a:rPr>
+              <a:t>các</a:t>
+            </a:r>
+            <a:r>
+              <a:rPr lang="en-US" dirty="0" smtClean="0">
+                <a:latin typeface="Times New Roman" panose="02020603050405020304" pitchFamily="18" charset="0"/>
+                <a:cs typeface="Times New Roman" panose="02020603050405020304" pitchFamily="18" charset="0"/>
+              </a:rPr>
+              <a:t> </a:t>
+            </a:r>
+            <a:r>
+              <a:rPr lang="en-US" dirty="0" err="1" smtClean="0">
+                <a:latin typeface="Times New Roman" panose="02020603050405020304" pitchFamily="18" charset="0"/>
+                <a:cs typeface="Times New Roman" panose="02020603050405020304" pitchFamily="18" charset="0"/>
+              </a:rPr>
+              <a:t>yêu</a:t>
+            </a:r>
+            <a:r>
+              <a:rPr lang="en-US" dirty="0" smtClean="0">
+                <a:latin typeface="Times New Roman" panose="02020603050405020304" pitchFamily="18" charset="0"/>
+                <a:cs typeface="Times New Roman" panose="02020603050405020304" pitchFamily="18" charset="0"/>
+              </a:rPr>
+              <a:t> </a:t>
+            </a:r>
+            <a:r>
+              <a:rPr lang="en-US" dirty="0" err="1" smtClean="0">
+                <a:latin typeface="Times New Roman" panose="02020603050405020304" pitchFamily="18" charset="0"/>
+                <a:cs typeface="Times New Roman" panose="02020603050405020304" pitchFamily="18" charset="0"/>
+              </a:rPr>
+              <a:t>cầu</a:t>
+            </a:r>
+            <a:r>
+              <a:rPr lang="en-US" dirty="0" smtClean="0">
+                <a:latin typeface="Times New Roman" panose="02020603050405020304" pitchFamily="18" charset="0"/>
+                <a:cs typeface="Times New Roman" panose="02020603050405020304" pitchFamily="18" charset="0"/>
+              </a:rPr>
+              <a:t> </a:t>
+            </a:r>
+            <a:r>
+              <a:rPr lang="en-US" dirty="0" err="1" smtClean="0">
+                <a:latin typeface="Times New Roman" panose="02020603050405020304" pitchFamily="18" charset="0"/>
+                <a:cs typeface="Times New Roman" panose="02020603050405020304" pitchFamily="18" charset="0"/>
+              </a:rPr>
+              <a:t>chức</a:t>
+            </a:r>
+            <a:r>
+              <a:rPr lang="en-US" dirty="0" smtClean="0">
+                <a:latin typeface="Times New Roman" panose="02020603050405020304" pitchFamily="18" charset="0"/>
+                <a:cs typeface="Times New Roman" panose="02020603050405020304" pitchFamily="18" charset="0"/>
+              </a:rPr>
+              <a:t> </a:t>
+            </a:r>
+            <a:r>
+              <a:rPr lang="en-US" dirty="0" err="1" smtClean="0">
+                <a:latin typeface="Times New Roman" panose="02020603050405020304" pitchFamily="18" charset="0"/>
+                <a:cs typeface="Times New Roman" panose="02020603050405020304" pitchFamily="18" charset="0"/>
+              </a:rPr>
+              <a:t>năng</a:t>
+            </a:r>
+            <a:r>
+              <a:rPr lang="en-US" dirty="0">
+                <a:latin typeface="Times New Roman" panose="02020603050405020304" pitchFamily="18" charset="0"/>
+                <a:cs typeface="Times New Roman" panose="02020603050405020304" pitchFamily="18" charset="0"/>
+              </a:rPr>
+              <a:t> </a:t>
+            </a:r>
+            <a:r>
+              <a:rPr lang="en-US" dirty="0" smtClean="0">
+                <a:latin typeface="Times New Roman" panose="02020603050405020304" pitchFamily="18" charset="0"/>
+                <a:cs typeface="Times New Roman" panose="02020603050405020304" pitchFamily="18" charset="0"/>
+              </a:rPr>
+              <a:t>(UCD).</a:t>
+            </a:r>
+          </a:p>
+          <a:p>
+            <a:pPr marL="457200" indent="-457200">
+              <a:buAutoNum type="arabicPeriod"/>
+            </a:pPr>
+            <a:r>
+              <a:rPr lang="en-US" dirty="0" err="1" smtClean="0">
+                <a:latin typeface="Times New Roman" panose="02020603050405020304" pitchFamily="18" charset="0"/>
+                <a:cs typeface="Times New Roman" panose="02020603050405020304" pitchFamily="18" charset="0"/>
+              </a:rPr>
+              <a:t>Phân</a:t>
+            </a:r>
+            <a:r>
+              <a:rPr lang="en-US" dirty="0" smtClean="0">
+                <a:latin typeface="Times New Roman" panose="02020603050405020304" pitchFamily="18" charset="0"/>
+                <a:cs typeface="Times New Roman" panose="02020603050405020304" pitchFamily="18" charset="0"/>
+              </a:rPr>
+              <a:t> </a:t>
+            </a:r>
+            <a:r>
+              <a:rPr lang="en-US" dirty="0" err="1" smtClean="0">
+                <a:latin typeface="Times New Roman" panose="02020603050405020304" pitchFamily="18" charset="0"/>
+                <a:cs typeface="Times New Roman" panose="02020603050405020304" pitchFamily="18" charset="0"/>
+              </a:rPr>
+              <a:t>tích</a:t>
+            </a:r>
+            <a:r>
+              <a:rPr lang="en-US" dirty="0" smtClean="0">
+                <a:latin typeface="Times New Roman" panose="02020603050405020304" pitchFamily="18" charset="0"/>
+                <a:cs typeface="Times New Roman" panose="02020603050405020304" pitchFamily="18" charset="0"/>
+              </a:rPr>
+              <a:t> </a:t>
+            </a:r>
+            <a:r>
+              <a:rPr lang="en-US" dirty="0" err="1" smtClean="0">
+                <a:latin typeface="Times New Roman" panose="02020603050405020304" pitchFamily="18" charset="0"/>
+                <a:cs typeface="Times New Roman" panose="02020603050405020304" pitchFamily="18" charset="0"/>
+              </a:rPr>
+              <a:t>thiết</a:t>
+            </a:r>
+            <a:r>
+              <a:rPr lang="en-US" dirty="0" smtClean="0">
+                <a:latin typeface="Times New Roman" panose="02020603050405020304" pitchFamily="18" charset="0"/>
+                <a:cs typeface="Times New Roman" panose="02020603050405020304" pitchFamily="18" charset="0"/>
+              </a:rPr>
+              <a:t> </a:t>
+            </a:r>
+            <a:r>
+              <a:rPr lang="en-US" dirty="0" err="1" smtClean="0">
+                <a:latin typeface="Times New Roman" panose="02020603050405020304" pitchFamily="18" charset="0"/>
+                <a:cs typeface="Times New Roman" panose="02020603050405020304" pitchFamily="18" charset="0"/>
+              </a:rPr>
+              <a:t>kế</a:t>
+            </a:r>
+            <a:r>
+              <a:rPr lang="en-US" dirty="0" smtClean="0">
+                <a:latin typeface="Times New Roman" panose="02020603050405020304" pitchFamily="18" charset="0"/>
+                <a:cs typeface="Times New Roman" panose="02020603050405020304" pitchFamily="18" charset="0"/>
+              </a:rPr>
+              <a:t> CSDL.</a:t>
+            </a:r>
+          </a:p>
+          <a:p>
+            <a:pPr marL="457200" indent="-457200">
+              <a:buAutoNum type="arabicPeriod"/>
+            </a:pPr>
+            <a:r>
+              <a:rPr lang="en-US" dirty="0" err="1" smtClean="0">
+                <a:latin typeface="Times New Roman" panose="02020603050405020304" pitchFamily="18" charset="0"/>
+                <a:cs typeface="Times New Roman" panose="02020603050405020304" pitchFamily="18" charset="0"/>
+              </a:rPr>
+              <a:t>Chọn</a:t>
+            </a:r>
+            <a:r>
+              <a:rPr lang="en-US" dirty="0" smtClean="0">
+                <a:latin typeface="Times New Roman" panose="02020603050405020304" pitchFamily="18" charset="0"/>
+                <a:cs typeface="Times New Roman" panose="02020603050405020304" pitchFamily="18" charset="0"/>
+              </a:rPr>
+              <a:t> </a:t>
+            </a:r>
+            <a:r>
+              <a:rPr lang="en-US" dirty="0" err="1" smtClean="0">
+                <a:latin typeface="Times New Roman" panose="02020603050405020304" pitchFamily="18" charset="0"/>
+                <a:cs typeface="Times New Roman" panose="02020603050405020304" pitchFamily="18" charset="0"/>
+              </a:rPr>
+              <a:t>mô</a:t>
+            </a:r>
+            <a:r>
+              <a:rPr lang="en-US" dirty="0" smtClean="0">
+                <a:latin typeface="Times New Roman" panose="02020603050405020304" pitchFamily="18" charset="0"/>
+                <a:cs typeface="Times New Roman" panose="02020603050405020304" pitchFamily="18" charset="0"/>
+              </a:rPr>
+              <a:t> </a:t>
+            </a:r>
+            <a:r>
+              <a:rPr lang="en-US" dirty="0" err="1" smtClean="0">
+                <a:latin typeface="Times New Roman" panose="02020603050405020304" pitchFamily="18" charset="0"/>
+                <a:cs typeface="Times New Roman" panose="02020603050405020304" pitchFamily="18" charset="0"/>
+              </a:rPr>
+              <a:t>hình</a:t>
+            </a:r>
+            <a:r>
+              <a:rPr lang="en-US" dirty="0" smtClean="0">
+                <a:latin typeface="Times New Roman" panose="02020603050405020304" pitchFamily="18" charset="0"/>
+                <a:cs typeface="Times New Roman" panose="02020603050405020304" pitchFamily="18" charset="0"/>
+              </a:rPr>
+              <a:t> </a:t>
+            </a:r>
+            <a:r>
+              <a:rPr lang="en-US" dirty="0" err="1" smtClean="0">
+                <a:latin typeface="Times New Roman" panose="02020603050405020304" pitchFamily="18" charset="0"/>
+                <a:cs typeface="Times New Roman" panose="02020603050405020304" pitchFamily="18" charset="0"/>
+              </a:rPr>
+              <a:t>phát</a:t>
+            </a:r>
+            <a:r>
+              <a:rPr lang="en-US" dirty="0" smtClean="0">
+                <a:latin typeface="Times New Roman" panose="02020603050405020304" pitchFamily="18" charset="0"/>
+                <a:cs typeface="Times New Roman" panose="02020603050405020304" pitchFamily="18" charset="0"/>
+              </a:rPr>
+              <a:t> </a:t>
+            </a:r>
+            <a:r>
+              <a:rPr lang="en-US" dirty="0" err="1" smtClean="0">
+                <a:latin typeface="Times New Roman" panose="02020603050405020304" pitchFamily="18" charset="0"/>
+                <a:cs typeface="Times New Roman" panose="02020603050405020304" pitchFamily="18" charset="0"/>
+              </a:rPr>
+              <a:t>triển</a:t>
+            </a:r>
+            <a:r>
+              <a:rPr lang="en-US" dirty="0" smtClean="0">
+                <a:latin typeface="Times New Roman" panose="02020603050405020304" pitchFamily="18" charset="0"/>
+                <a:cs typeface="Times New Roman" panose="02020603050405020304" pitchFamily="18" charset="0"/>
+              </a:rPr>
+              <a:t>.</a:t>
+            </a:r>
+          </a:p>
+          <a:p>
+            <a:pPr marL="457200" indent="-457200">
+              <a:buAutoNum type="arabicPeriod"/>
+            </a:pPr>
+            <a:r>
+              <a:rPr lang="en-US" dirty="0" err="1" smtClean="0">
+                <a:latin typeface="Times New Roman" panose="02020603050405020304" pitchFamily="18" charset="0"/>
+                <a:cs typeface="Times New Roman" panose="02020603050405020304" pitchFamily="18" charset="0"/>
+              </a:rPr>
+              <a:t>Thiết</a:t>
+            </a:r>
+            <a:r>
+              <a:rPr lang="en-US" dirty="0" smtClean="0">
+                <a:latin typeface="Times New Roman" panose="02020603050405020304" pitchFamily="18" charset="0"/>
+                <a:cs typeface="Times New Roman" panose="02020603050405020304" pitchFamily="18" charset="0"/>
+              </a:rPr>
+              <a:t> </a:t>
+            </a:r>
+            <a:r>
+              <a:rPr lang="en-US" dirty="0" err="1" smtClean="0">
+                <a:latin typeface="Times New Roman" panose="02020603050405020304" pitchFamily="18" charset="0"/>
+                <a:cs typeface="Times New Roman" panose="02020603050405020304" pitchFamily="18" charset="0"/>
+              </a:rPr>
+              <a:t>kế</a:t>
+            </a:r>
+            <a:r>
+              <a:rPr lang="en-US" dirty="0" smtClean="0">
+                <a:latin typeface="Times New Roman" panose="02020603050405020304" pitchFamily="18" charset="0"/>
+                <a:cs typeface="Times New Roman" panose="02020603050405020304" pitchFamily="18" charset="0"/>
+              </a:rPr>
+              <a:t> code.</a:t>
+            </a:r>
+          </a:p>
+          <a:p>
+            <a:pPr marL="457200" indent="-457200">
+              <a:buAutoNum type="arabicPeriod"/>
+            </a:pPr>
+            <a:r>
+              <a:rPr lang="en-US" dirty="0" err="1" smtClean="0">
+                <a:latin typeface="Times New Roman" panose="02020603050405020304" pitchFamily="18" charset="0"/>
+                <a:cs typeface="Times New Roman" panose="02020603050405020304" pitchFamily="18" charset="0"/>
+              </a:rPr>
+              <a:t>Phác</a:t>
+            </a:r>
+            <a:r>
+              <a:rPr lang="en-US" dirty="0" smtClean="0">
+                <a:latin typeface="Times New Roman" panose="02020603050405020304" pitchFamily="18" charset="0"/>
+                <a:cs typeface="Times New Roman" panose="02020603050405020304" pitchFamily="18" charset="0"/>
+              </a:rPr>
+              <a:t> </a:t>
+            </a:r>
+            <a:r>
+              <a:rPr lang="en-US" dirty="0" err="1" smtClean="0">
+                <a:latin typeface="Times New Roman" panose="02020603050405020304" pitchFamily="18" charset="0"/>
+                <a:cs typeface="Times New Roman" panose="02020603050405020304" pitchFamily="18" charset="0"/>
+              </a:rPr>
+              <a:t>thảo</a:t>
+            </a:r>
+            <a:r>
+              <a:rPr lang="en-US" dirty="0" smtClean="0">
+                <a:latin typeface="Times New Roman" panose="02020603050405020304" pitchFamily="18" charset="0"/>
+                <a:cs typeface="Times New Roman" panose="02020603050405020304" pitchFamily="18" charset="0"/>
+              </a:rPr>
+              <a:t> </a:t>
+            </a:r>
+            <a:r>
+              <a:rPr lang="en-US" dirty="0" err="1" smtClean="0">
+                <a:latin typeface="Times New Roman" panose="02020603050405020304" pitchFamily="18" charset="0"/>
+                <a:cs typeface="Times New Roman" panose="02020603050405020304" pitchFamily="18" charset="0"/>
+              </a:rPr>
+              <a:t>giao</a:t>
+            </a:r>
+            <a:r>
+              <a:rPr lang="en-US" dirty="0" smtClean="0">
+                <a:latin typeface="Times New Roman" panose="02020603050405020304" pitchFamily="18" charset="0"/>
+                <a:cs typeface="Times New Roman" panose="02020603050405020304" pitchFamily="18" charset="0"/>
+              </a:rPr>
+              <a:t> </a:t>
+            </a:r>
+            <a:r>
+              <a:rPr lang="en-US" dirty="0" err="1" smtClean="0">
+                <a:latin typeface="Times New Roman" panose="02020603050405020304" pitchFamily="18" charset="0"/>
+                <a:cs typeface="Times New Roman" panose="02020603050405020304" pitchFamily="18" charset="0"/>
+              </a:rPr>
+              <a:t>diện</a:t>
+            </a:r>
+            <a:r>
+              <a:rPr lang="en-US" dirty="0" smtClean="0">
+                <a:latin typeface="Times New Roman" panose="02020603050405020304" pitchFamily="18" charset="0"/>
+                <a:cs typeface="Times New Roman" panose="02020603050405020304" pitchFamily="18" charset="0"/>
+              </a:rPr>
+              <a:t> ban </a:t>
+            </a:r>
+            <a:r>
+              <a:rPr lang="en-US" dirty="0" err="1" smtClean="0">
+                <a:latin typeface="Times New Roman" panose="02020603050405020304" pitchFamily="18" charset="0"/>
+                <a:cs typeface="Times New Roman" panose="02020603050405020304" pitchFamily="18" charset="0"/>
+              </a:rPr>
+              <a:t>đầu</a:t>
+            </a:r>
+            <a:r>
+              <a:rPr lang="en-US" dirty="0" smtClean="0">
+                <a:latin typeface="Times New Roman" panose="02020603050405020304" pitchFamily="18" charset="0"/>
+                <a:cs typeface="Times New Roman" panose="02020603050405020304" pitchFamily="18" charset="0"/>
+              </a:rPr>
+              <a:t>.</a:t>
+            </a:r>
+            <a:endParaRPr lang="en-US" dirty="0">
+              <a:latin typeface="Times New Roman" panose="02020603050405020304" pitchFamily="18" charset="0"/>
+              <a:cs typeface="Times New Roman" panose="02020603050405020304" pitchFamily="18" charset="0"/>
+            </a:endParaRPr>
+          </a:p>
+        </p:txBody>
+      </p:sp>
+      <p:sp>
+        <p:nvSpPr>
+          <p:cNvPr id="3" name="Title 2"/>
+          <p:cNvSpPr>
+            <a:spLocks noGrp="1"/>
+          </p:cNvSpPr>
+          <p:nvPr>
+            <p:ph type="title"/>
+          </p:nvPr>
+        </p:nvSpPr>
+        <p:spPr>
+          <a:xfrm>
+            <a:off x="609600" y="152400"/>
+            <a:ext cx="7756263" cy="1054250"/>
+          </a:xfrm>
+        </p:spPr>
+        <p:txBody>
+          <a:bodyPr/>
+          <a:lstStyle/>
+          <a:p>
+            <a:pPr algn="l"/>
+            <a:r>
+              <a:rPr lang="en-US" sz="3200" dirty="0" smtClean="0">
+                <a:solidFill>
+                  <a:schemeClr val="tx2">
+                    <a:lumMod val="75000"/>
+                  </a:schemeClr>
+                </a:solidFill>
+                <a:latin typeface="Times New Roman" panose="02020603050405020304" pitchFamily="18" charset="0"/>
+                <a:cs typeface="Times New Roman" panose="02020603050405020304" pitchFamily="18" charset="0"/>
+              </a:rPr>
+              <a:t>II. </a:t>
+            </a:r>
+            <a:r>
+              <a:rPr lang="en-US" sz="3200" dirty="0" err="1" smtClean="0">
+                <a:solidFill>
+                  <a:schemeClr val="tx2">
+                    <a:lumMod val="75000"/>
+                  </a:schemeClr>
+                </a:solidFill>
+                <a:latin typeface="Times New Roman" panose="02020603050405020304" pitchFamily="18" charset="0"/>
+                <a:cs typeface="Times New Roman" panose="02020603050405020304" pitchFamily="18" charset="0"/>
+              </a:rPr>
+              <a:t>Thiết</a:t>
+            </a:r>
+            <a:r>
+              <a:rPr lang="en-US" sz="3200" dirty="0" smtClean="0">
+                <a:solidFill>
+                  <a:schemeClr val="tx2">
+                    <a:lumMod val="75000"/>
+                  </a:schemeClr>
+                </a:solidFill>
+                <a:latin typeface="Times New Roman" panose="02020603050405020304" pitchFamily="18" charset="0"/>
+                <a:cs typeface="Times New Roman" panose="02020603050405020304" pitchFamily="18" charset="0"/>
+              </a:rPr>
+              <a:t> </a:t>
+            </a:r>
+            <a:r>
+              <a:rPr lang="en-US" sz="3200" dirty="0" err="1" smtClean="0">
+                <a:solidFill>
+                  <a:schemeClr val="tx2">
+                    <a:lumMod val="75000"/>
+                  </a:schemeClr>
+                </a:solidFill>
+                <a:latin typeface="Times New Roman" panose="02020603050405020304" pitchFamily="18" charset="0"/>
+                <a:cs typeface="Times New Roman" panose="02020603050405020304" pitchFamily="18" charset="0"/>
+              </a:rPr>
+              <a:t>kế</a:t>
+            </a:r>
+            <a:r>
+              <a:rPr lang="en-US" sz="3200" dirty="0" smtClean="0">
+                <a:solidFill>
+                  <a:schemeClr val="tx2">
+                    <a:lumMod val="75000"/>
+                  </a:schemeClr>
+                </a:solidFill>
+                <a:latin typeface="Times New Roman" panose="02020603050405020304" pitchFamily="18" charset="0"/>
+                <a:cs typeface="Times New Roman" panose="02020603050405020304" pitchFamily="18" charset="0"/>
+              </a:rPr>
+              <a:t> </a:t>
+            </a:r>
+            <a:r>
+              <a:rPr lang="en-US" sz="3200" dirty="0" err="1" smtClean="0">
+                <a:solidFill>
+                  <a:schemeClr val="tx2">
+                    <a:lumMod val="75000"/>
+                  </a:schemeClr>
+                </a:solidFill>
+                <a:latin typeface="Times New Roman" panose="02020603050405020304" pitchFamily="18" charset="0"/>
+                <a:cs typeface="Times New Roman" panose="02020603050405020304" pitchFamily="18" charset="0"/>
+              </a:rPr>
+              <a:t>diễn</a:t>
+            </a:r>
+            <a:r>
+              <a:rPr lang="en-US" sz="3200" dirty="0" smtClean="0">
+                <a:solidFill>
+                  <a:schemeClr val="tx2">
+                    <a:lumMod val="75000"/>
+                  </a:schemeClr>
+                </a:solidFill>
+                <a:latin typeface="Times New Roman" panose="02020603050405020304" pitchFamily="18" charset="0"/>
+                <a:cs typeface="Times New Roman" panose="02020603050405020304" pitchFamily="18" charset="0"/>
+              </a:rPr>
+              <a:t> </a:t>
+            </a:r>
+            <a:r>
+              <a:rPr lang="en-US" sz="3200" dirty="0" err="1" smtClean="0">
+                <a:solidFill>
+                  <a:schemeClr val="tx2">
+                    <a:lumMod val="75000"/>
+                  </a:schemeClr>
+                </a:solidFill>
+                <a:latin typeface="Times New Roman" panose="02020603050405020304" pitchFamily="18" charset="0"/>
+                <a:cs typeface="Times New Roman" panose="02020603050405020304" pitchFamily="18" charset="0"/>
+              </a:rPr>
+              <a:t>đàn</a:t>
+            </a:r>
+            <a:r>
+              <a:rPr lang="en-US" sz="3200" dirty="0" smtClean="0">
+                <a:solidFill>
+                  <a:schemeClr val="tx2">
+                    <a:lumMod val="75000"/>
+                  </a:schemeClr>
+                </a:solidFill>
+                <a:latin typeface="Times New Roman" panose="02020603050405020304" pitchFamily="18" charset="0"/>
+                <a:cs typeface="Times New Roman" panose="02020603050405020304" pitchFamily="18" charset="0"/>
+              </a:rPr>
+              <a:t> CNTT</a:t>
+            </a:r>
+            <a:endParaRPr lang="en-US" sz="3200" dirty="0">
+              <a:solidFill>
+                <a:schemeClr val="tx2">
+                  <a:lumMod val="75000"/>
+                </a:schemeClr>
+              </a:solidFill>
+              <a:latin typeface="Times New Roman" panose="02020603050405020304" pitchFamily="18" charset="0"/>
+              <a:cs typeface="Times New Roman" panose="02020603050405020304" pitchFamily="18" charset="0"/>
+            </a:endParaRPr>
+          </a:p>
+        </p:txBody>
+      </p:sp>
+    </p:spTree>
+    <p:extLst>
+      <p:ext uri="{BB962C8B-B14F-4D97-AF65-F5344CB8AC3E}">
+        <p14:creationId xmlns:p14="http://schemas.microsoft.com/office/powerpoint/2010/main" val="3848830760"/>
+      </p:ext>
+    </p:extLst>
+  </p:cSld>
+  <p:clrMapOvr>
+    <a:masterClrMapping/>
+  </p:clrMapOvr>
+  <p:timing>
+    <p:tnLst>
+      <p:par>
+        <p:cTn id="1" dur="indefinite" restart="never" nodeType="tmRoot"/>
+      </p:par>
+    </p:tnLst>
+  </p:timing>
+</p:sld>
+</file>
+
+<file path=ppt/slides/slide16.xml><?xml version="1.0" encoding="utf-8"?>
+<p:sld xmlns:a="http://schemas.openxmlformats.org/drawingml/2006/main" xmlns:r="http://schemas.openxmlformats.org/officeDocument/2006/relationships" xmlns:p="http://schemas.openxmlformats.org/presentationml/2006/main">
+  <p:cSld>
+    <p:spTree>
+      <p:nvGrpSpPr>
+        <p:cNvPr id="1" name=""/>
+        <p:cNvGrpSpPr/>
+        <p:nvPr/>
+      </p:nvGrpSpPr>
+      <p:grpSpPr>
+        <a:xfrm>
+          <a:off x="0" y="0"/>
+          <a:ext cx="0" cy="0"/>
+          <a:chOff x="0" y="0"/>
+          <a:chExt cx="0" cy="0"/>
+        </a:xfrm>
+      </p:grpSpPr>
+      <p:sp>
+        <p:nvSpPr>
+          <p:cNvPr id="2" name="Content Placeholder 1"/>
+          <p:cNvSpPr>
+            <a:spLocks noGrp="1"/>
+          </p:cNvSpPr>
+          <p:nvPr>
+            <p:ph idx="1"/>
+          </p:nvPr>
+        </p:nvSpPr>
+        <p:spPr>
+          <a:xfrm>
+            <a:off x="699247" y="381001"/>
+            <a:ext cx="7745505" cy="5745162"/>
+          </a:xfrm>
+        </p:spPr>
+        <p:txBody>
+          <a:bodyPr/>
+          <a:lstStyle/>
+          <a:p>
+            <a:pPr marL="0" indent="0">
+              <a:buNone/>
+            </a:pPr>
+            <a:r>
+              <a:rPr lang="en-US" dirty="0" smtClean="0"/>
+              <a:t>1. </a:t>
+            </a:r>
+            <a:r>
+              <a:rPr lang="en-US" dirty="0" err="1" smtClean="0"/>
+              <a:t>Sơ</a:t>
+            </a:r>
+            <a:r>
+              <a:rPr lang="en-US" dirty="0" smtClean="0"/>
+              <a:t> </a:t>
+            </a:r>
+            <a:r>
+              <a:rPr lang="en-US" dirty="0" err="1" smtClean="0"/>
+              <a:t>đồ</a:t>
+            </a:r>
+            <a:r>
+              <a:rPr lang="en-US" dirty="0" smtClean="0"/>
+              <a:t> use case</a:t>
+            </a:r>
+          </a:p>
+          <a:p>
+            <a:pPr marL="0" indent="0">
+              <a:buNone/>
+            </a:pPr>
+            <a:endParaRPr lang="en-US" dirty="0"/>
+          </a:p>
+        </p:txBody>
+      </p:sp>
+      <p:pic>
+        <p:nvPicPr>
+          <p:cNvPr id="1026" name="Picture 2" descr="C:\Users\hieus\OneDrive\Máy tính\UC_BTL.jpg"/>
+          <p:cNvPicPr>
+            <a:picLocks noChangeAspect="1" noChangeArrowheads="1"/>
+          </p:cNvPicPr>
+          <p:nvPr/>
+        </p:nvPicPr>
+        <p:blipFill>
+          <a:blip r:embed="rId2">
+            <a:extLst>
+              <a:ext uri="{28A0092B-C50C-407E-A947-70E740481C1C}">
+                <a14:useLocalDpi xmlns:a14="http://schemas.microsoft.com/office/drawing/2010/main" val="0"/>
+              </a:ext>
+            </a:extLst>
+          </a:blip>
+          <a:srcRect/>
+          <a:stretch>
+            <a:fillRect/>
+          </a:stretch>
+        </p:blipFill>
+        <p:spPr bwMode="auto">
+          <a:xfrm>
+            <a:off x="1295400" y="914399"/>
+            <a:ext cx="6891068" cy="5539055"/>
+          </a:xfrm>
+          <a:prstGeom prst="rect">
+            <a:avLst/>
+          </a:prstGeom>
+          <a:noFill/>
+          <a:extLst>
+            <a:ext uri="{909E8E84-426E-40DD-AFC4-6F175D3DCCD1}">
+              <a14:hiddenFill xmlns:a14="http://schemas.microsoft.com/office/drawing/2010/main">
+                <a:solidFill>
+                  <a:srgbClr val="FFFFFF"/>
+                </a:solidFill>
+              </a14:hiddenFill>
+            </a:ext>
+          </a:extLst>
+        </p:spPr>
+      </p:pic>
+    </p:spTree>
+    <p:extLst>
+      <p:ext uri="{BB962C8B-B14F-4D97-AF65-F5344CB8AC3E}">
+        <p14:creationId xmlns:p14="http://schemas.microsoft.com/office/powerpoint/2010/main" val="2181941062"/>
+      </p:ext>
+    </p:extLst>
+  </p:cSld>
+  <p:clrMapOvr>
+    <a:masterClrMapping/>
+  </p:clrMapOvr>
+</p:sld>
+</file>
+
+<file path=ppt/slides/slide17.xml><?xml version="1.0" encoding="utf-8"?>
+<p:sld xmlns:a="http://schemas.openxmlformats.org/drawingml/2006/main" xmlns:r="http://schemas.openxmlformats.org/officeDocument/2006/relationships" xmlns:p="http://schemas.openxmlformats.org/presentationml/2006/main">
+  <p:cSld>
+    <p:spTree>
+      <p:nvGrpSpPr>
+        <p:cNvPr id="1" name=""/>
+        <p:cNvGrpSpPr/>
+        <p:nvPr/>
+      </p:nvGrpSpPr>
+      <p:grpSpPr>
+        <a:xfrm>
+          <a:off x="0" y="0"/>
+          <a:ext cx="0" cy="0"/>
+          <a:chOff x="0" y="0"/>
+          <a:chExt cx="0" cy="0"/>
+        </a:xfrm>
+      </p:grpSpPr>
+      <p:sp>
+        <p:nvSpPr>
+          <p:cNvPr id="2" name="Content Placeholder 1"/>
+          <p:cNvSpPr>
+            <a:spLocks noGrp="1"/>
+          </p:cNvSpPr>
+          <p:nvPr>
+            <p:ph idx="1"/>
+          </p:nvPr>
+        </p:nvSpPr>
         <p:spPr>
           <a:xfrm>
             <a:off x="699247" y="533401"/>
@@ -7136,7 +7591,7 @@
 </p:sld>
 </file>
 
-<file path=ppt/slides/slide14.xml><?xml version="1.0" encoding="utf-8"?>
+<file path=ppt/slides/slide18.xml><?xml version="1.0" encoding="utf-8"?>
 <p:sld xmlns:a="http://schemas.openxmlformats.org/drawingml/2006/main" xmlns:r="http://schemas.openxmlformats.org/officeDocument/2006/relationships" xmlns:p="http://schemas.openxmlformats.org/presentationml/2006/main">
   <p:cSld>
     <p:spTree>
@@ -7347,7 +7802,7 @@
 </p:sld>
 </file>
 
-<file path=ppt/slides/slide15.xml><?xml version="1.0" encoding="utf-8"?>
+<file path=ppt/slides/slide19.xml><?xml version="1.0" encoding="utf-8"?>
 <p:sld xmlns:a="http://schemas.openxmlformats.org/drawingml/2006/main" xmlns:r="http://schemas.openxmlformats.org/officeDocument/2006/relationships" xmlns:p="http://schemas.openxmlformats.org/presentationml/2006/main">
   <p:cSld>
     <p:spTree>
@@ -7685,7 +8140,165 @@
 </p:sld>
 </file>
 
-<file path=ppt/slides/slide16.xml><?xml version="1.0" encoding="utf-8"?>
+<file path=ppt/slides/slide2.xml><?xml version="1.0" encoding="utf-8"?>
+<p:sld xmlns:a="http://schemas.openxmlformats.org/drawingml/2006/main" xmlns:r="http://schemas.openxmlformats.org/officeDocument/2006/relationships" xmlns:p="http://schemas.openxmlformats.org/presentationml/2006/main">
+  <p:cSld>
+    <p:spTree>
+      <p:nvGrpSpPr>
+        <p:cNvPr id="1" name=""/>
+        <p:cNvGrpSpPr/>
+        <p:nvPr/>
+      </p:nvGrpSpPr>
+      <p:grpSpPr>
+        <a:xfrm>
+          <a:off x="0" y="0"/>
+          <a:ext cx="0" cy="0"/>
+          <a:chOff x="0" y="0"/>
+          <a:chExt cx="0" cy="0"/>
+        </a:xfrm>
+      </p:grpSpPr>
+      <p:sp>
+        <p:nvSpPr>
+          <p:cNvPr id="8" name="Content Placeholder 7"/>
+          <p:cNvSpPr>
+            <a:spLocks noGrp="1"/>
+          </p:cNvSpPr>
+          <p:nvPr>
+            <p:ph idx="1"/>
+          </p:nvPr>
+        </p:nvSpPr>
+        <p:spPr>
+          <a:xfrm>
+            <a:off x="699247" y="381001"/>
+            <a:ext cx="7745505" cy="5745162"/>
+          </a:xfrm>
+        </p:spPr>
+        <p:txBody>
+          <a:bodyPr/>
+          <a:lstStyle/>
+          <a:p>
+            <a:r>
+              <a:rPr lang="en-US" dirty="0" err="1" smtClean="0"/>
+              <a:t>Nội</a:t>
+            </a:r>
+            <a:r>
+              <a:rPr lang="en-US" dirty="0" smtClean="0"/>
+              <a:t> dung </a:t>
+            </a:r>
+            <a:r>
+              <a:rPr lang="en-US" dirty="0" err="1" smtClean="0"/>
+              <a:t>trình</a:t>
+            </a:r>
+            <a:r>
+              <a:rPr lang="en-US" dirty="0" smtClean="0"/>
+              <a:t> </a:t>
+            </a:r>
+            <a:r>
+              <a:rPr lang="en-US" dirty="0" err="1" smtClean="0"/>
+              <a:t>bày</a:t>
+            </a:r>
+            <a:r>
+              <a:rPr lang="en-US" dirty="0" smtClean="0"/>
+              <a:t>:</a:t>
+            </a:r>
+          </a:p>
+          <a:p>
+            <a:pPr marL="514350" indent="-514350">
+              <a:buFont typeface="+mj-lt"/>
+              <a:buAutoNum type="romanUcPeriod"/>
+            </a:pPr>
+            <a:r>
+              <a:rPr lang="en-US" dirty="0" smtClean="0"/>
+              <a:t>C</a:t>
+            </a:r>
+            <a:r>
+              <a:rPr lang="vi-VN" dirty="0" smtClean="0"/>
+              <a:t>hỉ </a:t>
+            </a:r>
+            <a:r>
+              <a:rPr lang="vi-VN" dirty="0"/>
+              <a:t>ra các vấn đề hiện tại cần khắc phục trên trang Web của khoa CNTT tại địa chỉ: </a:t>
+            </a:r>
+            <a:r>
+              <a:rPr lang="vi-VN" dirty="0" smtClean="0"/>
+              <a:t>cse.tlu.edu.v</a:t>
+            </a:r>
+            <a:r>
+              <a:rPr lang="en-US" dirty="0" smtClean="0"/>
+              <a:t>n</a:t>
+            </a:r>
+          </a:p>
+          <a:p>
+            <a:pPr marL="514350" indent="-514350">
+              <a:buFont typeface="+mj-lt"/>
+              <a:buAutoNum type="romanUcPeriod"/>
+            </a:pPr>
+            <a:endParaRPr lang="en-US" dirty="0"/>
+          </a:p>
+          <a:p>
+            <a:pPr marL="514350" indent="-514350">
+              <a:buFont typeface="+mj-lt"/>
+              <a:buAutoNum type="romanUcPeriod"/>
+            </a:pPr>
+            <a:r>
+              <a:rPr lang="vi-VN" dirty="0"/>
+              <a:t>Đề xuất và Thiết kế lại trang Web của </a:t>
+            </a:r>
+            <a:r>
+              <a:rPr lang="vi-VN" dirty="0" smtClean="0"/>
+              <a:t>Khoa</a:t>
+            </a:r>
+            <a:r>
+              <a:rPr lang="en-US" dirty="0" smtClean="0"/>
+              <a:t>.</a:t>
+            </a:r>
+          </a:p>
+          <a:p>
+            <a:pPr marL="514350" indent="-514350">
+              <a:buFont typeface="+mj-lt"/>
+              <a:buAutoNum type="romanUcPeriod"/>
+            </a:pPr>
+            <a:r>
+              <a:rPr lang="vi-VN" dirty="0"/>
+              <a:t>Thiết kế </a:t>
+            </a:r>
+            <a:r>
+              <a:rPr lang="en-US" dirty="0"/>
+              <a:t>d</a:t>
+            </a:r>
+            <a:r>
+              <a:rPr lang="vi-VN" dirty="0" smtClean="0"/>
+              <a:t>iễn </a:t>
+            </a:r>
+            <a:r>
+              <a:rPr lang="vi-VN" dirty="0"/>
+              <a:t>đàn trao đổi thông tin.</a:t>
+            </a:r>
+            <a:endParaRPr lang="en-US" dirty="0"/>
+          </a:p>
+        </p:txBody>
+      </p:sp>
+    </p:spTree>
+    <p:extLst>
+      <p:ext uri="{BB962C8B-B14F-4D97-AF65-F5344CB8AC3E}">
+        <p14:creationId xmlns:p14="http://schemas.microsoft.com/office/powerpoint/2010/main" val="2877386427"/>
+      </p:ext>
+    </p:extLst>
+  </p:cSld>
+  <p:clrMapOvr>
+    <a:masterClrMapping/>
+  </p:clrMapOvr>
+  <p:timing>
+    <p:tnLst>
+      <p:par>
+        <p:cTn id="1" dur="indefinite" restart="never" nodeType="tmRoot"/>
+      </p:par>
+    </p:tnLst>
+  </p:timing>
+</p:sld>
+</file>
+
+<file path=ppt/slides/slide20.xml><?xml version="1.0" encoding="utf-8"?>
 <p:sld xmlns:a="http://schemas.openxmlformats.org/drawingml/2006/main" xmlns:r="http://schemas.openxmlformats.org/officeDocument/2006/relationships" xmlns:p="http://schemas.openxmlformats.org/presentationml/2006/main">
   <p:cSld>
     <p:spTree>
@@ -7827,164 +8440,6 @@
   <p:clrMapOvr>
     <a:masterClrMapping/>
   </p:clrMapOvr>
-</p:sld>
-</file>
-
-<file path=ppt/slides/slide2.xml><?xml version="1.0" encoding="utf-8"?>
-<p:sld xmlns:a="http://schemas.openxmlformats.org/drawingml/2006/main" xmlns:r="http://schemas.openxmlformats.org/officeDocument/2006/relationships" xmlns:p="http://schemas.openxmlformats.org/presentationml/2006/main">
-  <p:cSld>
-    <p:spTree>
-      <p:nvGrpSpPr>
-        <p:cNvPr id="1" name=""/>
-        <p:cNvGrpSpPr/>
-        <p:nvPr/>
-      </p:nvGrpSpPr>
-      <p:grpSpPr>
-        <a:xfrm>
-          <a:off x="0" y="0"/>
-          <a:ext cx="0" cy="0"/>
-          <a:chOff x="0" y="0"/>
-          <a:chExt cx="0" cy="0"/>
-        </a:xfrm>
-      </p:grpSpPr>
-      <p:sp>
-        <p:nvSpPr>
-          <p:cNvPr id="8" name="Content Placeholder 7"/>
-          <p:cNvSpPr>
-            <a:spLocks noGrp="1"/>
-          </p:cNvSpPr>
-          <p:nvPr>
-            <p:ph idx="1"/>
-          </p:nvPr>
-        </p:nvSpPr>
-        <p:spPr>
-          <a:xfrm>
-            <a:off x="699247" y="381001"/>
-            <a:ext cx="7745505" cy="5745162"/>
-          </a:xfrm>
-        </p:spPr>
-        <p:txBody>
-          <a:bodyPr/>
-          <a:lstStyle/>
-          <a:p>
-            <a:r>
-              <a:rPr lang="en-US" dirty="0" err="1" smtClean="0"/>
-              <a:t>Nội</a:t>
-            </a:r>
-            <a:r>
-              <a:rPr lang="en-US" dirty="0" smtClean="0"/>
-              <a:t> dung </a:t>
-            </a:r>
-            <a:r>
-              <a:rPr lang="en-US" dirty="0" err="1" smtClean="0"/>
-              <a:t>trình</a:t>
-            </a:r>
-            <a:r>
-              <a:rPr lang="en-US" dirty="0" smtClean="0"/>
-              <a:t> </a:t>
-            </a:r>
-            <a:r>
-              <a:rPr lang="en-US" dirty="0" err="1" smtClean="0"/>
-              <a:t>bày</a:t>
-            </a:r>
-            <a:r>
-              <a:rPr lang="en-US" dirty="0" smtClean="0"/>
-              <a:t>:</a:t>
-            </a:r>
-          </a:p>
-          <a:p>
-            <a:pPr marL="514350" indent="-514350">
-              <a:buFont typeface="+mj-lt"/>
-              <a:buAutoNum type="romanUcPeriod"/>
-            </a:pPr>
-            <a:r>
-              <a:rPr lang="en-US" dirty="0" smtClean="0"/>
-              <a:t>C</a:t>
-            </a:r>
-            <a:r>
-              <a:rPr lang="vi-VN" dirty="0" smtClean="0"/>
-              <a:t>hỉ </a:t>
-            </a:r>
-            <a:r>
-              <a:rPr lang="vi-VN" dirty="0"/>
-              <a:t>ra các vấn đề hiện tại cần khắc phục trên trang Web của khoa CNTT tại địa chỉ: </a:t>
-            </a:r>
-            <a:r>
-              <a:rPr lang="vi-VN" dirty="0" smtClean="0"/>
-              <a:t>cse.tlu.edu.v</a:t>
-            </a:r>
-            <a:r>
-              <a:rPr lang="en-US" dirty="0" smtClean="0"/>
-              <a:t>n</a:t>
-            </a:r>
-          </a:p>
-          <a:p>
-            <a:pPr marL="514350" indent="-514350">
-              <a:buFont typeface="+mj-lt"/>
-              <a:buAutoNum type="romanUcPeriod"/>
-            </a:pPr>
-            <a:endParaRPr lang="en-US" dirty="0"/>
-          </a:p>
-          <a:p>
-            <a:pPr marL="514350" indent="-514350">
-              <a:buFont typeface="+mj-lt"/>
-              <a:buAutoNum type="romanUcPeriod"/>
-            </a:pPr>
-            <a:r>
-              <a:rPr lang="vi-VN" dirty="0"/>
-              <a:t>Đề xuất và Thiết kế lại trang Web của </a:t>
-            </a:r>
-            <a:r>
-              <a:rPr lang="vi-VN" dirty="0" smtClean="0"/>
-              <a:t>Khoa</a:t>
-            </a:r>
-            <a:r>
-              <a:rPr lang="en-US" dirty="0" smtClean="0"/>
-              <a:t>.</a:t>
-            </a:r>
-          </a:p>
-          <a:p>
-            <a:pPr marL="514350" indent="-514350">
-              <a:buFont typeface="+mj-lt"/>
-              <a:buAutoNum type="romanUcPeriod"/>
-            </a:pPr>
-            <a:r>
-              <a:rPr lang="vi-VN" dirty="0"/>
-              <a:t>Thiết kế </a:t>
-            </a:r>
-            <a:r>
-              <a:rPr lang="en-US" dirty="0"/>
-              <a:t>d</a:t>
-            </a:r>
-            <a:r>
-              <a:rPr lang="vi-VN" dirty="0" smtClean="0"/>
-              <a:t>iễn </a:t>
-            </a:r>
-            <a:r>
-              <a:rPr lang="vi-VN" dirty="0"/>
-              <a:t>đàn trao đổi thông tin.</a:t>
-            </a:r>
-            <a:endParaRPr lang="en-US" dirty="0"/>
-          </a:p>
-        </p:txBody>
-      </p:sp>
-    </p:spTree>
-    <p:extLst>
-      <p:ext uri="{BB962C8B-B14F-4D97-AF65-F5344CB8AC3E}">
-        <p14:creationId xmlns:p14="http://schemas.microsoft.com/office/powerpoint/2010/main" val="2877386427"/>
-      </p:ext>
-    </p:extLst>
-  </p:cSld>
-  <p:clrMapOvr>
-    <a:masterClrMapping/>
-  </p:clrMapOvr>
-  <p:timing>
-    <p:tnLst>
-      <p:par>
-        <p:cTn id="1" dur="indefinite" restart="never" nodeType="tmRoot"/>
-      </p:par>
-    </p:tnLst>
-  </p:timing>
 </p:sld>
 </file>
 

</xml_diff>